<commit_message>
changed undo redo icon
</commit_message>
<xml_diff>
--- a/bubbletodo/fig/undo.pptx
+++ b/bubbletodo/fig/undo.pptx
@@ -6,8 +6,9 @@
   </p:sldMasterIdLst>
   <p:sldIdLst>
     <p:sldId id="256" r:id="rId2"/>
-    <p:sldId id="258" r:id="rId3"/>
-    <p:sldId id="257" r:id="rId4"/>
+    <p:sldId id="259" r:id="rId3"/>
+    <p:sldId id="258" r:id="rId4"/>
+    <p:sldId id="257" r:id="rId5"/>
   </p:sldIdLst>
   <p:sldSz cx="12192000" cy="6858000"/>
   <p:notesSz cx="6858000" cy="9144000"/>
@@ -261,7 +262,7 @@
           <a:p>
             <a:fld id="{77A36852-2FA2-B74C-8A89-9251C28B97FE}" type="datetimeFigureOut">
               <a:rPr kumimoji="1" lang="ja-JP" altLang="en-US" smtClean="0"/>
-              <a:t>2022/2/7</a:t>
+              <a:t>2022/2/9</a:t>
             </a:fld>
             <a:endParaRPr kumimoji="1" lang="ja-JP" altLang="en-US"/>
           </a:p>
@@ -491,7 +492,7 @@
           <a:p>
             <a:fld id="{77A36852-2FA2-B74C-8A89-9251C28B97FE}" type="datetimeFigureOut">
               <a:rPr kumimoji="1" lang="ja-JP" altLang="en-US" smtClean="0"/>
-              <a:t>2022/2/7</a:t>
+              <a:t>2022/2/9</a:t>
             </a:fld>
             <a:endParaRPr kumimoji="1" lang="ja-JP" altLang="en-US"/>
           </a:p>
@@ -731,7 +732,7 @@
           <a:p>
             <a:fld id="{77A36852-2FA2-B74C-8A89-9251C28B97FE}" type="datetimeFigureOut">
               <a:rPr kumimoji="1" lang="ja-JP" altLang="en-US" smtClean="0"/>
-              <a:t>2022/2/7</a:t>
+              <a:t>2022/2/9</a:t>
             </a:fld>
             <a:endParaRPr kumimoji="1" lang="ja-JP" altLang="en-US"/>
           </a:p>
@@ -961,7 +962,7 @@
           <a:p>
             <a:fld id="{77A36852-2FA2-B74C-8A89-9251C28B97FE}" type="datetimeFigureOut">
               <a:rPr kumimoji="1" lang="ja-JP" altLang="en-US" smtClean="0"/>
-              <a:t>2022/2/7</a:t>
+              <a:t>2022/2/9</a:t>
             </a:fld>
             <a:endParaRPr kumimoji="1" lang="ja-JP" altLang="en-US"/>
           </a:p>
@@ -1236,7 +1237,7 @@
           <a:p>
             <a:fld id="{77A36852-2FA2-B74C-8A89-9251C28B97FE}" type="datetimeFigureOut">
               <a:rPr kumimoji="1" lang="ja-JP" altLang="en-US" smtClean="0"/>
-              <a:t>2022/2/7</a:t>
+              <a:t>2022/2/9</a:t>
             </a:fld>
             <a:endParaRPr kumimoji="1" lang="ja-JP" altLang="en-US"/>
           </a:p>
@@ -1565,7 +1566,7 @@
           <a:p>
             <a:fld id="{77A36852-2FA2-B74C-8A89-9251C28B97FE}" type="datetimeFigureOut">
               <a:rPr kumimoji="1" lang="ja-JP" altLang="en-US" smtClean="0"/>
-              <a:t>2022/2/7</a:t>
+              <a:t>2022/2/9</a:t>
             </a:fld>
             <a:endParaRPr kumimoji="1" lang="ja-JP" altLang="en-US"/>
           </a:p>
@@ -2041,7 +2042,7 @@
           <a:p>
             <a:fld id="{77A36852-2FA2-B74C-8A89-9251C28B97FE}" type="datetimeFigureOut">
               <a:rPr kumimoji="1" lang="ja-JP" altLang="en-US" smtClean="0"/>
-              <a:t>2022/2/7</a:t>
+              <a:t>2022/2/9</a:t>
             </a:fld>
             <a:endParaRPr kumimoji="1" lang="ja-JP" altLang="en-US"/>
           </a:p>
@@ -2182,7 +2183,7 @@
           <a:p>
             <a:fld id="{77A36852-2FA2-B74C-8A89-9251C28B97FE}" type="datetimeFigureOut">
               <a:rPr kumimoji="1" lang="ja-JP" altLang="en-US" smtClean="0"/>
-              <a:t>2022/2/7</a:t>
+              <a:t>2022/2/9</a:t>
             </a:fld>
             <a:endParaRPr kumimoji="1" lang="ja-JP" altLang="en-US"/>
           </a:p>
@@ -2295,7 +2296,7 @@
           <a:p>
             <a:fld id="{77A36852-2FA2-B74C-8A89-9251C28B97FE}" type="datetimeFigureOut">
               <a:rPr kumimoji="1" lang="ja-JP" altLang="en-US" smtClean="0"/>
-              <a:t>2022/2/7</a:t>
+              <a:t>2022/2/9</a:t>
             </a:fld>
             <a:endParaRPr kumimoji="1" lang="ja-JP" altLang="en-US"/>
           </a:p>
@@ -2638,7 +2639,7 @@
           <a:p>
             <a:fld id="{77A36852-2FA2-B74C-8A89-9251C28B97FE}" type="datetimeFigureOut">
               <a:rPr kumimoji="1" lang="ja-JP" altLang="en-US" smtClean="0"/>
-              <a:t>2022/2/7</a:t>
+              <a:t>2022/2/9</a:t>
             </a:fld>
             <a:endParaRPr kumimoji="1" lang="ja-JP" altLang="en-US"/>
           </a:p>
@@ -2926,7 +2927,7 @@
           <a:p>
             <a:fld id="{77A36852-2FA2-B74C-8A89-9251C28B97FE}" type="datetimeFigureOut">
               <a:rPr kumimoji="1" lang="ja-JP" altLang="en-US" smtClean="0"/>
-              <a:t>2022/2/7</a:t>
+              <a:t>2022/2/9</a:t>
             </a:fld>
             <a:endParaRPr kumimoji="1" lang="ja-JP" altLang="en-US"/>
           </a:p>
@@ -3199,7 +3200,7 @@
           <a:p>
             <a:fld id="{77A36852-2FA2-B74C-8A89-9251C28B97FE}" type="datetimeFigureOut">
               <a:rPr kumimoji="1" lang="ja-JP" altLang="en-US" smtClean="0"/>
-              <a:t>2022/2/7</a:t>
+              <a:t>2022/2/9</a:t>
             </a:fld>
             <a:endParaRPr kumimoji="1" lang="ja-JP" altLang="en-US"/>
           </a:p>
@@ -3644,7 +3645,77 @@
         </p:blipFill>
         <p:spPr>
           <a:xfrm>
-            <a:off x="4707924" y="1960605"/>
+            <a:off x="1792196" y="1537910"/>
+            <a:ext cx="3142736" cy="3142736"/>
+          </a:xfrm>
+          <a:prstGeom prst="rect">
+            <a:avLst/>
+          </a:prstGeom>
+        </p:spPr>
+      </p:pic>
+      <p:pic>
+        <p:nvPicPr>
+          <p:cNvPr id="3" name="グラフィックス 2" descr="左矢印付きの円 単色塗りつぶし">
+            <a:extLst>
+              <a:ext uri="{FF2B5EF4-FFF2-40B4-BE49-F238E27FC236}">
+                <a16:creationId xmlns:a16="http://schemas.microsoft.com/office/drawing/2014/main" id="{9B3D453A-B716-244A-ADAA-10164CC4F67A}"/>
+              </a:ext>
+            </a:extLst>
+          </p:cNvPr>
+          <p:cNvPicPr>
+            <a:picLocks noChangeAspect="1"/>
+          </p:cNvPicPr>
+          <p:nvPr/>
+        </p:nvPicPr>
+        <p:blipFill>
+          <a:blip r:embed="rId4">
+            <a:extLst>
+              <a:ext uri="{96DAC541-7B7A-43D3-8B79-37D633B846F1}">
+                <asvg:svgBlip xmlns:asvg="http://schemas.microsoft.com/office/drawing/2016/SVG/main" r:embed="rId5"/>
+              </a:ext>
+            </a:extLst>
+          </a:blip>
+          <a:srcRect/>
+          <a:stretch/>
+        </p:blipFill>
+        <p:spPr>
+          <a:xfrm flipH="1">
+            <a:off x="6422089" y="3115501"/>
+            <a:ext cx="3142736" cy="3142736"/>
+          </a:xfrm>
+          <a:prstGeom prst="rect">
+            <a:avLst/>
+          </a:prstGeom>
+        </p:spPr>
+      </p:pic>
+      <p:pic>
+        <p:nvPicPr>
+          <p:cNvPr id="4" name="グラフィックス 3" descr="左矢印付きの円 単色塗りつぶし">
+            <a:extLst>
+              <a:ext uri="{FF2B5EF4-FFF2-40B4-BE49-F238E27FC236}">
+                <a16:creationId xmlns:a16="http://schemas.microsoft.com/office/drawing/2014/main" id="{E202410F-1E05-7040-AC73-0AA80397B0DD}"/>
+              </a:ext>
+            </a:extLst>
+          </p:cNvPr>
+          <p:cNvPicPr>
+            <a:picLocks noChangeAspect="1"/>
+          </p:cNvPicPr>
+          <p:nvPr/>
+        </p:nvPicPr>
+        <p:blipFill>
+          <a:blip r:embed="rId4">
+            <a:extLst>
+              <a:ext uri="{96DAC541-7B7A-43D3-8B79-37D633B846F1}">
+                <asvg:svgBlip xmlns:asvg="http://schemas.microsoft.com/office/drawing/2016/SVG/main" r:embed="rId5"/>
+              </a:ext>
+            </a:extLst>
+          </a:blip>
+          <a:srcRect/>
+          <a:stretch/>
+        </p:blipFill>
+        <p:spPr>
+          <a:xfrm rot="10800000" flipH="1">
+            <a:off x="2535775" y="3115501"/>
             <a:ext cx="3142736" cy="3142736"/>
           </a:xfrm>
           <a:prstGeom prst="rect">
@@ -3666,6 +3737,630 @@
 </file>
 
 <file path=ppt/slides/slide2.xml><?xml version="1.0" encoding="utf-8"?>
+<p:sld xmlns:a="http://schemas.openxmlformats.org/drawingml/2006/main" xmlns:r="http://schemas.openxmlformats.org/officeDocument/2006/relationships" xmlns:p="http://schemas.openxmlformats.org/presentationml/2006/main">
+  <p:cSld>
+    <p:spTree>
+      <p:nvGrpSpPr>
+        <p:cNvPr id="1" name=""/>
+        <p:cNvGrpSpPr/>
+        <p:nvPr/>
+      </p:nvGrpSpPr>
+      <p:grpSpPr>
+        <a:xfrm>
+          <a:off x="0" y="0"/>
+          <a:ext cx="0" cy="0"/>
+          <a:chOff x="0" y="0"/>
+          <a:chExt cx="0" cy="0"/>
+        </a:xfrm>
+      </p:grpSpPr>
+      <p:sp>
+        <p:nvSpPr>
+          <p:cNvPr id="15" name="円/楕円 14">
+            <a:extLst>
+              <a:ext uri="{FF2B5EF4-FFF2-40B4-BE49-F238E27FC236}">
+                <a16:creationId xmlns:a16="http://schemas.microsoft.com/office/drawing/2014/main" id="{66B38080-7F8F-CC45-953A-4B8FCDCB48F5}"/>
+              </a:ext>
+            </a:extLst>
+          </p:cNvPr>
+          <p:cNvSpPr/>
+          <p:nvPr/>
+        </p:nvSpPr>
+        <p:spPr>
+          <a:xfrm>
+            <a:off x="-255089" y="3284061"/>
+            <a:ext cx="3573939" cy="3573939"/>
+          </a:xfrm>
+          <a:prstGeom prst="ellipse">
+            <a:avLst/>
+          </a:prstGeom>
+          <a:noFill/>
+          <a:ln w="107950">
+            <a:solidFill>
+              <a:srgbClr val="AFABAB"/>
+            </a:solidFill>
+          </a:ln>
+        </p:spPr>
+        <p:style>
+          <a:lnRef idx="2">
+            <a:schemeClr val="accent1">
+              <a:shade val="50000"/>
+            </a:schemeClr>
+          </a:lnRef>
+          <a:fillRef idx="1">
+            <a:schemeClr val="accent1"/>
+          </a:fillRef>
+          <a:effectRef idx="0">
+            <a:schemeClr val="accent1"/>
+          </a:effectRef>
+          <a:fontRef idx="minor">
+            <a:schemeClr val="lt1"/>
+          </a:fontRef>
+        </p:style>
+        <p:txBody>
+          <a:bodyPr rtlCol="0" anchor="ctr"/>
+          <a:lstStyle/>
+          <a:p>
+            <a:pPr algn="ctr"/>
+            <a:endParaRPr kumimoji="1" lang="ja-JP" altLang="en-US"/>
+          </a:p>
+        </p:txBody>
+      </p:sp>
+      <p:pic>
+        <p:nvPicPr>
+          <p:cNvPr id="4" name="グラフィックス 3" descr="戻る 枠線">
+            <a:extLst>
+              <a:ext uri="{FF2B5EF4-FFF2-40B4-BE49-F238E27FC236}">
+                <a16:creationId xmlns:a16="http://schemas.microsoft.com/office/drawing/2014/main" id="{E202410F-1E05-7040-AC73-0AA80397B0DD}"/>
+              </a:ext>
+            </a:extLst>
+          </p:cNvPr>
+          <p:cNvPicPr>
+            <a:picLocks noChangeAspect="1"/>
+          </p:cNvPicPr>
+          <p:nvPr/>
+        </p:nvPicPr>
+        <p:blipFill>
+          <a:blip r:embed="rId2">
+            <a:extLst>
+              <a:ext uri="{96DAC541-7B7A-43D3-8B79-37D633B846F1}">
+                <asvg:svgBlip xmlns:asvg="http://schemas.microsoft.com/office/drawing/2016/SVG/main" r:embed="rId3"/>
+              </a:ext>
+            </a:extLst>
+          </a:blip>
+          <a:srcRect/>
+          <a:stretch/>
+        </p:blipFill>
+        <p:spPr>
+          <a:xfrm>
+            <a:off x="6641203" y="553572"/>
+            <a:ext cx="3142736" cy="3142736"/>
+          </a:xfrm>
+          <a:prstGeom prst="rect">
+            <a:avLst/>
+          </a:prstGeom>
+        </p:spPr>
+      </p:pic>
+      <p:sp>
+        <p:nvSpPr>
+          <p:cNvPr id="10" name="グラフィックス 4" descr="線矢印: 水平方向の U ターン 単色塗りつぶし">
+            <a:extLst>
+              <a:ext uri="{FF2B5EF4-FFF2-40B4-BE49-F238E27FC236}">
+                <a16:creationId xmlns:a16="http://schemas.microsoft.com/office/drawing/2014/main" id="{9B141B22-1E54-A846-9362-78EA211B0C0D}"/>
+              </a:ext>
+            </a:extLst>
+          </p:cNvPr>
+          <p:cNvSpPr/>
+          <p:nvPr/>
+        </p:nvSpPr>
+        <p:spPr>
+          <a:xfrm>
+            <a:off x="2420365" y="4733060"/>
+            <a:ext cx="2625493" cy="1701552"/>
+          </a:xfrm>
+          <a:custGeom>
+            <a:avLst/>
+            <a:gdLst>
+              <a:gd name="connsiteX0" fmla="*/ 2003494 w 2625493"/>
+              <a:gd name="connsiteY0" fmla="*/ 457553 h 1701552"/>
+              <a:gd name="connsiteX1" fmla="*/ 340463 w 2625493"/>
+              <a:gd name="connsiteY1" fmla="*/ 457553 h 1701552"/>
+              <a:gd name="connsiteX2" fmla="*/ 631821 w 2625493"/>
+              <a:gd name="connsiteY2" fmla="*/ 166195 h 1701552"/>
+              <a:gd name="connsiteX3" fmla="*/ 628547 w 2625493"/>
+              <a:gd name="connsiteY3" fmla="*/ 28700 h 1701552"/>
+              <a:gd name="connsiteX4" fmla="*/ 491053 w 2625493"/>
+              <a:gd name="connsiteY4" fmla="*/ 25427 h 1701552"/>
+              <a:gd name="connsiteX5" fmla="*/ 29463 w 2625493"/>
+              <a:gd name="connsiteY5" fmla="*/ 490290 h 1701552"/>
+              <a:gd name="connsiteX6" fmla="*/ 6547 w 2625493"/>
+              <a:gd name="connsiteY6" fmla="*/ 523027 h 1701552"/>
+              <a:gd name="connsiteX7" fmla="*/ 6547 w 2625493"/>
+              <a:gd name="connsiteY7" fmla="*/ 523027 h 1701552"/>
+              <a:gd name="connsiteX8" fmla="*/ 3274 w 2625493"/>
+              <a:gd name="connsiteY8" fmla="*/ 532848 h 1701552"/>
+              <a:gd name="connsiteX9" fmla="*/ 0 w 2625493"/>
+              <a:gd name="connsiteY9" fmla="*/ 539395 h 1701552"/>
+              <a:gd name="connsiteX10" fmla="*/ 0 w 2625493"/>
+              <a:gd name="connsiteY10" fmla="*/ 549216 h 1701552"/>
+              <a:gd name="connsiteX11" fmla="*/ 3274 w 2625493"/>
+              <a:gd name="connsiteY11" fmla="*/ 559037 h 1701552"/>
+              <a:gd name="connsiteX12" fmla="*/ 3274 w 2625493"/>
+              <a:gd name="connsiteY12" fmla="*/ 565585 h 1701552"/>
+              <a:gd name="connsiteX13" fmla="*/ 32737 w 2625493"/>
+              <a:gd name="connsiteY13" fmla="*/ 627785 h 1701552"/>
+              <a:gd name="connsiteX14" fmla="*/ 494326 w 2625493"/>
+              <a:gd name="connsiteY14" fmla="*/ 1092648 h 1701552"/>
+              <a:gd name="connsiteX15" fmla="*/ 631821 w 2625493"/>
+              <a:gd name="connsiteY15" fmla="*/ 1089374 h 1701552"/>
+              <a:gd name="connsiteX16" fmla="*/ 635095 w 2625493"/>
+              <a:gd name="connsiteY16" fmla="*/ 951879 h 1701552"/>
+              <a:gd name="connsiteX17" fmla="*/ 330642 w 2625493"/>
+              <a:gd name="connsiteY17" fmla="*/ 653974 h 1701552"/>
+              <a:gd name="connsiteX18" fmla="*/ 2000221 w 2625493"/>
+              <a:gd name="connsiteY18" fmla="*/ 653974 h 1701552"/>
+              <a:gd name="connsiteX19" fmla="*/ 2425799 w 2625493"/>
+              <a:gd name="connsiteY19" fmla="*/ 1079553 h 1701552"/>
+              <a:gd name="connsiteX20" fmla="*/ 2000221 w 2625493"/>
+              <a:gd name="connsiteY20" fmla="*/ 1505132 h 1701552"/>
+              <a:gd name="connsiteX21" fmla="*/ 101484 w 2625493"/>
+              <a:gd name="connsiteY21" fmla="*/ 1505132 h 1701552"/>
+              <a:gd name="connsiteX22" fmla="*/ 3274 w 2625493"/>
+              <a:gd name="connsiteY22" fmla="*/ 1603342 h 1701552"/>
+              <a:gd name="connsiteX23" fmla="*/ 101484 w 2625493"/>
+              <a:gd name="connsiteY23" fmla="*/ 1701553 h 1701552"/>
+              <a:gd name="connsiteX24" fmla="*/ 2003494 w 2625493"/>
+              <a:gd name="connsiteY24" fmla="*/ 1701553 h 1701552"/>
+              <a:gd name="connsiteX25" fmla="*/ 2625494 w 2625493"/>
+              <a:gd name="connsiteY25" fmla="*/ 1079553 h 1701552"/>
+              <a:gd name="connsiteX26" fmla="*/ 2003494 w 2625493"/>
+              <a:gd name="connsiteY26" fmla="*/ 457553 h 1701552"/>
+            </a:gdLst>
+            <a:ahLst/>
+            <a:cxnLst>
+              <a:cxn ang="0">
+                <a:pos x="connsiteX0" y="connsiteY0"/>
+              </a:cxn>
+              <a:cxn ang="0">
+                <a:pos x="connsiteX1" y="connsiteY1"/>
+              </a:cxn>
+              <a:cxn ang="0">
+                <a:pos x="connsiteX2" y="connsiteY2"/>
+              </a:cxn>
+              <a:cxn ang="0">
+                <a:pos x="connsiteX3" y="connsiteY3"/>
+              </a:cxn>
+              <a:cxn ang="0">
+                <a:pos x="connsiteX4" y="connsiteY4"/>
+              </a:cxn>
+              <a:cxn ang="0">
+                <a:pos x="connsiteX5" y="connsiteY5"/>
+              </a:cxn>
+              <a:cxn ang="0">
+                <a:pos x="connsiteX6" y="connsiteY6"/>
+              </a:cxn>
+              <a:cxn ang="0">
+                <a:pos x="connsiteX7" y="connsiteY7"/>
+              </a:cxn>
+              <a:cxn ang="0">
+                <a:pos x="connsiteX8" y="connsiteY8"/>
+              </a:cxn>
+              <a:cxn ang="0">
+                <a:pos x="connsiteX9" y="connsiteY9"/>
+              </a:cxn>
+              <a:cxn ang="0">
+                <a:pos x="connsiteX10" y="connsiteY10"/>
+              </a:cxn>
+              <a:cxn ang="0">
+                <a:pos x="connsiteX11" y="connsiteY11"/>
+              </a:cxn>
+              <a:cxn ang="0">
+                <a:pos x="connsiteX12" y="connsiteY12"/>
+              </a:cxn>
+              <a:cxn ang="0">
+                <a:pos x="connsiteX13" y="connsiteY13"/>
+              </a:cxn>
+              <a:cxn ang="0">
+                <a:pos x="connsiteX14" y="connsiteY14"/>
+              </a:cxn>
+              <a:cxn ang="0">
+                <a:pos x="connsiteX15" y="connsiteY15"/>
+              </a:cxn>
+              <a:cxn ang="0">
+                <a:pos x="connsiteX16" y="connsiteY16"/>
+              </a:cxn>
+              <a:cxn ang="0">
+                <a:pos x="connsiteX17" y="connsiteY17"/>
+              </a:cxn>
+              <a:cxn ang="0">
+                <a:pos x="connsiteX18" y="connsiteY18"/>
+              </a:cxn>
+              <a:cxn ang="0">
+                <a:pos x="connsiteX19" y="connsiteY19"/>
+              </a:cxn>
+              <a:cxn ang="0">
+                <a:pos x="connsiteX20" y="connsiteY20"/>
+              </a:cxn>
+              <a:cxn ang="0">
+                <a:pos x="connsiteX21" y="connsiteY21"/>
+              </a:cxn>
+              <a:cxn ang="0">
+                <a:pos x="connsiteX22" y="connsiteY22"/>
+              </a:cxn>
+              <a:cxn ang="0">
+                <a:pos x="connsiteX23" y="connsiteY23"/>
+              </a:cxn>
+              <a:cxn ang="0">
+                <a:pos x="connsiteX24" y="connsiteY24"/>
+              </a:cxn>
+              <a:cxn ang="0">
+                <a:pos x="connsiteX25" y="connsiteY25"/>
+              </a:cxn>
+              <a:cxn ang="0">
+                <a:pos x="connsiteX26" y="connsiteY26"/>
+              </a:cxn>
+            </a:cxnLst>
+            <a:rect l="l" t="t" r="r" b="b"/>
+            <a:pathLst>
+              <a:path w="2625493" h="1701552">
+                <a:moveTo>
+                  <a:pt x="2003494" y="457553"/>
+                </a:moveTo>
+                <a:lnTo>
+                  <a:pt x="340463" y="457553"/>
+                </a:lnTo>
+                <a:lnTo>
+                  <a:pt x="631821" y="166195"/>
+                </a:lnTo>
+                <a:cubicBezTo>
+                  <a:pt x="667831" y="126911"/>
+                  <a:pt x="667831" y="67985"/>
+                  <a:pt x="628547" y="28700"/>
+                </a:cubicBezTo>
+                <a:cubicBezTo>
+                  <a:pt x="592537" y="-7310"/>
+                  <a:pt x="530337" y="-10584"/>
+                  <a:pt x="491053" y="25427"/>
+                </a:cubicBezTo>
+                <a:lnTo>
+                  <a:pt x="29463" y="490290"/>
+                </a:lnTo>
+                <a:cubicBezTo>
+                  <a:pt x="19642" y="500111"/>
+                  <a:pt x="13095" y="509932"/>
+                  <a:pt x="6547" y="523027"/>
+                </a:cubicBezTo>
+                <a:lnTo>
+                  <a:pt x="6547" y="523027"/>
+                </a:lnTo>
+                <a:cubicBezTo>
+                  <a:pt x="6547" y="526300"/>
+                  <a:pt x="3274" y="529574"/>
+                  <a:pt x="3274" y="532848"/>
+                </a:cubicBezTo>
+                <a:cubicBezTo>
+                  <a:pt x="3274" y="536121"/>
+                  <a:pt x="3274" y="536121"/>
+                  <a:pt x="0" y="539395"/>
+                </a:cubicBezTo>
+                <a:cubicBezTo>
+                  <a:pt x="0" y="542669"/>
+                  <a:pt x="0" y="545942"/>
+                  <a:pt x="0" y="549216"/>
+                </a:cubicBezTo>
+                <a:cubicBezTo>
+                  <a:pt x="3274" y="555764"/>
+                  <a:pt x="3274" y="555764"/>
+                  <a:pt x="3274" y="559037"/>
+                </a:cubicBezTo>
+                <a:cubicBezTo>
+                  <a:pt x="3274" y="562311"/>
+                  <a:pt x="3274" y="562311"/>
+                  <a:pt x="3274" y="565585"/>
+                </a:cubicBezTo>
+                <a:cubicBezTo>
+                  <a:pt x="3274" y="588500"/>
+                  <a:pt x="16368" y="611416"/>
+                  <a:pt x="32737" y="627785"/>
+                </a:cubicBezTo>
+                <a:lnTo>
+                  <a:pt x="494326" y="1092648"/>
+                </a:lnTo>
+                <a:cubicBezTo>
+                  <a:pt x="533610" y="1128658"/>
+                  <a:pt x="592537" y="1128658"/>
+                  <a:pt x="631821" y="1089374"/>
+                </a:cubicBezTo>
+                <a:cubicBezTo>
+                  <a:pt x="667831" y="1053363"/>
+                  <a:pt x="671105" y="991163"/>
+                  <a:pt x="635095" y="951879"/>
+                </a:cubicBezTo>
+                <a:lnTo>
+                  <a:pt x="330642" y="653974"/>
+                </a:lnTo>
+                <a:lnTo>
+                  <a:pt x="2000221" y="653974"/>
+                </a:lnTo>
+                <a:cubicBezTo>
+                  <a:pt x="2235926" y="653974"/>
+                  <a:pt x="2425799" y="843848"/>
+                  <a:pt x="2425799" y="1079553"/>
+                </a:cubicBezTo>
+                <a:cubicBezTo>
+                  <a:pt x="2425799" y="1315258"/>
+                  <a:pt x="2235926" y="1505132"/>
+                  <a:pt x="2000221" y="1505132"/>
+                </a:cubicBezTo>
+                <a:lnTo>
+                  <a:pt x="101484" y="1505132"/>
+                </a:lnTo>
+                <a:cubicBezTo>
+                  <a:pt x="45832" y="1505132"/>
+                  <a:pt x="3274" y="1547690"/>
+                  <a:pt x="3274" y="1603342"/>
+                </a:cubicBezTo>
+                <a:cubicBezTo>
+                  <a:pt x="3274" y="1658995"/>
+                  <a:pt x="45832" y="1701553"/>
+                  <a:pt x="101484" y="1701553"/>
+                </a:cubicBezTo>
+                <a:lnTo>
+                  <a:pt x="2003494" y="1701553"/>
+                </a:lnTo>
+                <a:cubicBezTo>
+                  <a:pt x="2347231" y="1701553"/>
+                  <a:pt x="2625494" y="1423290"/>
+                  <a:pt x="2625494" y="1079553"/>
+                </a:cubicBezTo>
+                <a:cubicBezTo>
+                  <a:pt x="2625494" y="735816"/>
+                  <a:pt x="2347231" y="457553"/>
+                  <a:pt x="2003494" y="457553"/>
+                </a:cubicBezTo>
+                <a:close/>
+              </a:path>
+            </a:pathLst>
+          </a:custGeom>
+          <a:solidFill>
+            <a:schemeClr val="bg1"/>
+          </a:solidFill>
+          <a:ln w="123825" cap="flat">
+            <a:solidFill>
+              <a:schemeClr val="bg2">
+                <a:lumMod val="75000"/>
+              </a:schemeClr>
+            </a:solidFill>
+            <a:prstDash val="solid"/>
+            <a:miter/>
+          </a:ln>
+        </p:spPr>
+        <p:txBody>
+          <a:bodyPr rtlCol="0" anchor="ctr"/>
+          <a:lstStyle/>
+          <a:p>
+            <a:endParaRPr lang="ja-JP" altLang="en-US"/>
+          </a:p>
+        </p:txBody>
+      </p:sp>
+      <p:pic>
+        <p:nvPicPr>
+          <p:cNvPr id="12" name="グラフィックス 11" descr="戻る 枠線">
+            <a:extLst>
+              <a:ext uri="{FF2B5EF4-FFF2-40B4-BE49-F238E27FC236}">
+                <a16:creationId xmlns:a16="http://schemas.microsoft.com/office/drawing/2014/main" id="{A419B0F5-F3BF-A248-B342-6CB9015B6FA1}"/>
+              </a:ext>
+            </a:extLst>
+          </p:cNvPr>
+          <p:cNvPicPr>
+            <a:picLocks noChangeAspect="1"/>
+          </p:cNvPicPr>
+          <p:nvPr/>
+        </p:nvPicPr>
+        <p:blipFill>
+          <a:blip r:embed="rId4">
+            <a:extLst>
+              <a:ext uri="{96DAC541-7B7A-43D3-8B79-37D633B846F1}">
+                <asvg:svgBlip xmlns:asvg="http://schemas.microsoft.com/office/drawing/2016/SVG/main" r:embed="rId5"/>
+              </a:ext>
+            </a:extLst>
+          </a:blip>
+          <a:srcRect/>
+          <a:stretch/>
+        </p:blipFill>
+        <p:spPr>
+          <a:xfrm>
+            <a:off x="6641203" y="553572"/>
+            <a:ext cx="3142736" cy="3142736"/>
+          </a:xfrm>
+          <a:prstGeom prst="rect">
+            <a:avLst/>
+          </a:prstGeom>
+        </p:spPr>
+      </p:pic>
+      <p:pic>
+        <p:nvPicPr>
+          <p:cNvPr id="13" name="グラフィックス 12" descr="戻る 枠線">
+            <a:extLst>
+              <a:ext uri="{FF2B5EF4-FFF2-40B4-BE49-F238E27FC236}">
+                <a16:creationId xmlns:a16="http://schemas.microsoft.com/office/drawing/2014/main" id="{B951E63C-00AA-A74C-ADB7-2396A7CDE006}"/>
+              </a:ext>
+            </a:extLst>
+          </p:cNvPr>
+          <p:cNvPicPr>
+            <a:picLocks noChangeAspect="1"/>
+          </p:cNvPicPr>
+          <p:nvPr/>
+        </p:nvPicPr>
+        <p:blipFill>
+          <a:blip r:embed="rId2">
+            <a:extLst>
+              <a:ext uri="{96DAC541-7B7A-43D3-8B79-37D633B846F1}">
+                <asvg:svgBlip xmlns:asvg="http://schemas.microsoft.com/office/drawing/2016/SVG/main" r:embed="rId3"/>
+              </a:ext>
+            </a:extLst>
+          </a:blip>
+          <a:srcRect/>
+          <a:stretch/>
+        </p:blipFill>
+        <p:spPr>
+          <a:xfrm flipH="1">
+            <a:off x="2953264" y="553572"/>
+            <a:ext cx="3142736" cy="3142736"/>
+          </a:xfrm>
+          <a:prstGeom prst="rect">
+            <a:avLst/>
+          </a:prstGeom>
+        </p:spPr>
+      </p:pic>
+      <p:pic>
+        <p:nvPicPr>
+          <p:cNvPr id="14" name="グラフィックス 13" descr="戻る 枠線">
+            <a:extLst>
+              <a:ext uri="{FF2B5EF4-FFF2-40B4-BE49-F238E27FC236}">
+                <a16:creationId xmlns:a16="http://schemas.microsoft.com/office/drawing/2014/main" id="{24C94E6B-2E59-7B44-BDBF-79E36D2596B5}"/>
+              </a:ext>
+            </a:extLst>
+          </p:cNvPr>
+          <p:cNvPicPr>
+            <a:picLocks noChangeAspect="1"/>
+          </p:cNvPicPr>
+          <p:nvPr/>
+        </p:nvPicPr>
+        <p:blipFill>
+          <a:blip r:embed="rId4">
+            <a:extLst>
+              <a:ext uri="{96DAC541-7B7A-43D3-8B79-37D633B846F1}">
+                <asvg:svgBlip xmlns:asvg="http://schemas.microsoft.com/office/drawing/2016/SVG/main" r:embed="rId5"/>
+              </a:ext>
+            </a:extLst>
+          </a:blip>
+          <a:srcRect/>
+          <a:stretch/>
+        </p:blipFill>
+        <p:spPr>
+          <a:xfrm flipH="1">
+            <a:off x="2953264" y="553572"/>
+            <a:ext cx="3142736" cy="3142736"/>
+          </a:xfrm>
+          <a:prstGeom prst="rect">
+            <a:avLst/>
+          </a:prstGeom>
+        </p:spPr>
+      </p:pic>
+      <p:sp>
+        <p:nvSpPr>
+          <p:cNvPr id="16" name="テキスト ボックス 15">
+            <a:extLst>
+              <a:ext uri="{FF2B5EF4-FFF2-40B4-BE49-F238E27FC236}">
+                <a16:creationId xmlns:a16="http://schemas.microsoft.com/office/drawing/2014/main" id="{07013A4D-F766-6A46-AEE8-A788D18A7E38}"/>
+              </a:ext>
+            </a:extLst>
+          </p:cNvPr>
+          <p:cNvSpPr txBox="1"/>
+          <p:nvPr/>
+        </p:nvSpPr>
+        <p:spPr>
+          <a:xfrm>
+            <a:off x="3639714" y="3429000"/>
+            <a:ext cx="2540819" cy="923330"/>
+          </a:xfrm>
+          <a:prstGeom prst="rect">
+            <a:avLst/>
+          </a:prstGeom>
+          <a:noFill/>
+        </p:spPr>
+        <p:txBody>
+          <a:bodyPr wrap="square" rtlCol="0">
+            <a:spAutoFit/>
+          </a:bodyPr>
+          <a:lstStyle/>
+          <a:p>
+            <a:r>
+              <a:rPr kumimoji="1" lang="en-US" altLang="ja-JP" sz="5400" dirty="0">
+                <a:ln w="28575">
+                  <a:solidFill>
+                    <a:srgbClr val="AFABAB"/>
+                  </a:solidFill>
+                </a:ln>
+                <a:noFill/>
+              </a:rPr>
+              <a:t>Undo</a:t>
+            </a:r>
+            <a:endParaRPr kumimoji="1" lang="ja-JP" altLang="en-US" sz="5400">
+              <a:ln w="28575">
+                <a:solidFill>
+                  <a:srgbClr val="AFABAB"/>
+                </a:solidFill>
+              </a:ln>
+              <a:noFill/>
+            </a:endParaRPr>
+          </a:p>
+        </p:txBody>
+      </p:sp>
+      <p:sp>
+        <p:nvSpPr>
+          <p:cNvPr id="17" name="テキスト ボックス 16">
+            <a:extLst>
+              <a:ext uri="{FF2B5EF4-FFF2-40B4-BE49-F238E27FC236}">
+                <a16:creationId xmlns:a16="http://schemas.microsoft.com/office/drawing/2014/main" id="{B3811546-DE69-4D42-A374-17674D56806A}"/>
+              </a:ext>
+            </a:extLst>
+          </p:cNvPr>
+          <p:cNvSpPr txBox="1"/>
+          <p:nvPr/>
+        </p:nvSpPr>
+        <p:spPr>
+          <a:xfrm>
+            <a:off x="7412187" y="3429000"/>
+            <a:ext cx="2540819" cy="923330"/>
+          </a:xfrm>
+          <a:prstGeom prst="rect">
+            <a:avLst/>
+          </a:prstGeom>
+          <a:noFill/>
+        </p:spPr>
+        <p:txBody>
+          <a:bodyPr wrap="square" rtlCol="0">
+            <a:spAutoFit/>
+          </a:bodyPr>
+          <a:lstStyle/>
+          <a:p>
+            <a:r>
+              <a:rPr kumimoji="1" lang="en-US" altLang="ja-JP" sz="5400" dirty="0">
+                <a:ln w="28575">
+                  <a:solidFill>
+                    <a:srgbClr val="AFABAB"/>
+                  </a:solidFill>
+                </a:ln>
+                <a:noFill/>
+              </a:rPr>
+              <a:t>Redo</a:t>
+            </a:r>
+            <a:endParaRPr kumimoji="1" lang="ja-JP" altLang="en-US" sz="5400">
+              <a:ln w="28575">
+                <a:solidFill>
+                  <a:srgbClr val="AFABAB"/>
+                </a:solidFill>
+              </a:ln>
+              <a:noFill/>
+            </a:endParaRPr>
+          </a:p>
+        </p:txBody>
+      </p:sp>
+    </p:spTree>
+    <p:extLst>
+      <p:ext uri="{BB962C8B-B14F-4D97-AF65-F5344CB8AC3E}">
+        <p14:creationId xmlns:p14="http://schemas.microsoft.com/office/powerpoint/2010/main" val="1262773937"/>
+      </p:ext>
+    </p:extLst>
+  </p:cSld>
+  <p:clrMapOvr>
+    <a:masterClrMapping/>
+  </p:clrMapOvr>
+</p:sld>
+</file>
+
+<file path=ppt/slides/slide3.xml><?xml version="1.0" encoding="utf-8"?>
 <p:sld xmlns:a="http://schemas.openxmlformats.org/drawingml/2006/main" xmlns:r="http://schemas.openxmlformats.org/officeDocument/2006/relationships" xmlns:p="http://schemas.openxmlformats.org/presentationml/2006/main">
   <p:cSld>
     <p:bg>
@@ -4245,7 +4940,7 @@
 </p:sld>
 </file>
 
-<file path=ppt/slides/slide3.xml><?xml version="1.0" encoding="utf-8"?>
+<file path=ppt/slides/slide4.xml><?xml version="1.0" encoding="utf-8"?>
 <p:sld xmlns:a="http://schemas.openxmlformats.org/drawingml/2006/main" xmlns:r="http://schemas.openxmlformats.org/officeDocument/2006/relationships" xmlns:p="http://schemas.openxmlformats.org/presentationml/2006/main">
   <p:cSld>
     <p:bg>

</xml_diff>